<commit_message>
Add the Lego part
</commit_message>
<xml_diff>
--- a/毕业论文/xArray/pic.pptx
+++ b/毕业论文/xArray/pic.pptx
@@ -5,7 +5,7 @@
     <p:sldMasterId id="2147483648" r:id="rId1"/>
   </p:sldMasterIdLst>
   <p:notesMasterIdLst>
-    <p:notesMasterId r:id="rId8"/>
+    <p:notesMasterId r:id="rId11"/>
   </p:notesMasterIdLst>
   <p:sldIdLst>
     <p:sldId id="256" r:id="rId2"/>
@@ -14,6 +14,9 @@
     <p:sldId id="259" r:id="rId5"/>
     <p:sldId id="260" r:id="rId6"/>
     <p:sldId id="261" r:id="rId7"/>
+    <p:sldId id="262" r:id="rId8"/>
+    <p:sldId id="263" r:id="rId9"/>
+    <p:sldId id="264" r:id="rId10"/>
   </p:sldIdLst>
   <p:sldSz cx="12192000" cy="6858000"/>
   <p:notesSz cx="6858000" cy="9144000"/>
@@ -202,7 +205,7 @@
           <a:p>
             <a:fld id="{A5DBCD46-789F-6E4B-B0D2-3FE5FE7738E2}" type="datetimeFigureOut">
               <a:rPr lang="en-US" smtClean="0"/>
-              <a:t>5/2/18</a:t>
+              <a:t>5/7/18</a:t>
             </a:fld>
             <a:endParaRPr lang="en-US"/>
           </a:p>
@@ -978,7 +981,7 @@
           <a:p>
             <a:fld id="{E38C0961-A87F-3342-9B44-F7081ACB0812}" type="datetimeFigureOut">
               <a:rPr lang="en-US" smtClean="0"/>
-              <a:t>5/2/18</a:t>
+              <a:t>5/7/18</a:t>
             </a:fld>
             <a:endParaRPr lang="en-US"/>
           </a:p>
@@ -1148,7 +1151,7 @@
           <a:p>
             <a:fld id="{E38C0961-A87F-3342-9B44-F7081ACB0812}" type="datetimeFigureOut">
               <a:rPr lang="en-US" smtClean="0"/>
-              <a:t>5/2/18</a:t>
+              <a:t>5/7/18</a:t>
             </a:fld>
             <a:endParaRPr lang="en-US"/>
           </a:p>
@@ -1328,7 +1331,7 @@
           <a:p>
             <a:fld id="{E38C0961-A87F-3342-9B44-F7081ACB0812}" type="datetimeFigureOut">
               <a:rPr lang="en-US" smtClean="0"/>
-              <a:t>5/2/18</a:t>
+              <a:t>5/7/18</a:t>
             </a:fld>
             <a:endParaRPr lang="en-US"/>
           </a:p>
@@ -1498,7 +1501,7 @@
           <a:p>
             <a:fld id="{E38C0961-A87F-3342-9B44-F7081ACB0812}" type="datetimeFigureOut">
               <a:rPr lang="en-US" smtClean="0"/>
-              <a:t>5/2/18</a:t>
+              <a:t>5/7/18</a:t>
             </a:fld>
             <a:endParaRPr lang="en-US"/>
           </a:p>
@@ -1744,7 +1747,7 @@
           <a:p>
             <a:fld id="{E38C0961-A87F-3342-9B44-F7081ACB0812}" type="datetimeFigureOut">
               <a:rPr lang="en-US" smtClean="0"/>
-              <a:t>5/2/18</a:t>
+              <a:t>5/7/18</a:t>
             </a:fld>
             <a:endParaRPr lang="en-US"/>
           </a:p>
@@ -1976,7 +1979,7 @@
           <a:p>
             <a:fld id="{E38C0961-A87F-3342-9B44-F7081ACB0812}" type="datetimeFigureOut">
               <a:rPr lang="en-US" smtClean="0"/>
-              <a:t>5/2/18</a:t>
+              <a:t>5/7/18</a:t>
             </a:fld>
             <a:endParaRPr lang="en-US"/>
           </a:p>
@@ -2343,7 +2346,7 @@
           <a:p>
             <a:fld id="{E38C0961-A87F-3342-9B44-F7081ACB0812}" type="datetimeFigureOut">
               <a:rPr lang="en-US" smtClean="0"/>
-              <a:t>5/2/18</a:t>
+              <a:t>5/7/18</a:t>
             </a:fld>
             <a:endParaRPr lang="en-US"/>
           </a:p>
@@ -2461,7 +2464,7 @@
           <a:p>
             <a:fld id="{E38C0961-A87F-3342-9B44-F7081ACB0812}" type="datetimeFigureOut">
               <a:rPr lang="en-US" smtClean="0"/>
-              <a:t>5/2/18</a:t>
+              <a:t>5/7/18</a:t>
             </a:fld>
             <a:endParaRPr lang="en-US"/>
           </a:p>
@@ -2556,7 +2559,7 @@
           <a:p>
             <a:fld id="{E38C0961-A87F-3342-9B44-F7081ACB0812}" type="datetimeFigureOut">
               <a:rPr lang="en-US" smtClean="0"/>
-              <a:t>5/2/18</a:t>
+              <a:t>5/7/18</a:t>
             </a:fld>
             <a:endParaRPr lang="en-US"/>
           </a:p>
@@ -2833,7 +2836,7 @@
           <a:p>
             <a:fld id="{E38C0961-A87F-3342-9B44-F7081ACB0812}" type="datetimeFigureOut">
               <a:rPr lang="en-US" smtClean="0"/>
-              <a:t>5/2/18</a:t>
+              <a:t>5/7/18</a:t>
             </a:fld>
             <a:endParaRPr lang="en-US"/>
           </a:p>
@@ -3086,7 +3089,7 @@
           <a:p>
             <a:fld id="{E38C0961-A87F-3342-9B44-F7081ACB0812}" type="datetimeFigureOut">
               <a:rPr lang="en-US" smtClean="0"/>
-              <a:t>5/2/18</a:t>
+              <a:t>5/7/18</a:t>
             </a:fld>
             <a:endParaRPr lang="en-US"/>
           </a:p>
@@ -3299,7 +3302,7 @@
           <a:p>
             <a:fld id="{E38C0961-A87F-3342-9B44-F7081ACB0812}" type="datetimeFigureOut">
               <a:rPr lang="en-US" smtClean="0"/>
-              <a:t>5/2/18</a:t>
+              <a:t>5/7/18</a:t>
             </a:fld>
             <a:endParaRPr lang="en-US"/>
           </a:p>
@@ -3799,7 +3802,7 @@
               <a:pPr>
                 <a:defRPr/>
               </a:pPr>
-              <a:t>2018/5/2</a:t>
+              <a:t>2018/5/7</a:t>
             </a:fld>
             <a:endParaRPr lang="en-US" altLang="zh-CN"/>
           </a:p>
@@ -21863,8 +21866,8 @@
             </a:ln>
           </p:spPr>
         </p:pic>
-        <mc:AlternateContent xmlns:mc="http://schemas.openxmlformats.org/markup-compatibility/2006">
-          <mc:Choice xmlns:a14="http://schemas.microsoft.com/office/drawing/2010/main" Requires="a14">
+        <mc:AlternateContent xmlns:mc="http://schemas.openxmlformats.org/markup-compatibility/2006" xmlns:a14="http://schemas.microsoft.com/office/drawing/2010/main">
+          <mc:Choice Requires="a14">
             <p:sp>
               <p:nvSpPr>
                 <p:cNvPr id="7" name="TextBox 6"/>
@@ -21887,6 +21890,7 @@
                 </a:bodyPr>
                 <a:lstStyle/>
                 <a:p>
+                  <a:pPr/>
                   <a14:m>
                     <m:oMathPara xmlns:m="http://schemas.openxmlformats.org/officeDocument/2006/math">
                       <m:oMathParaPr>
@@ -22187,7 +22191,7 @@
               </p:txBody>
             </p:sp>
           </mc:Choice>
-          <mc:Fallback>
+          <mc:Fallback xmlns="">
             <p:sp>
               <p:nvSpPr>
                 <p:cNvPr id="7" name="TextBox 6"/>
@@ -22321,10 +22325,1590 @@
           <a:chExt cx="0" cy="0"/>
         </a:xfrm>
       </p:grpSpPr>
+      <p:grpSp>
+        <p:nvGrpSpPr>
+          <p:cNvPr id="9" name="Group 8"/>
+          <p:cNvGrpSpPr/>
+          <p:nvPr/>
+        </p:nvGrpSpPr>
+        <p:grpSpPr>
+          <a:xfrm>
+            <a:off x="3225800" y="825500"/>
+            <a:ext cx="7276882" cy="5194300"/>
+            <a:chOff x="3225800" y="825500"/>
+            <a:chExt cx="7276882" cy="5194300"/>
+          </a:xfrm>
+        </p:grpSpPr>
+        <p:pic>
+          <p:nvPicPr>
+            <p:cNvPr id="2" name="Picture 1"/>
+            <p:cNvPicPr>
+              <a:picLocks noChangeAspect="1"/>
+            </p:cNvPicPr>
+            <p:nvPr/>
+          </p:nvPicPr>
+          <p:blipFill>
+            <a:blip r:embed="rId2">
+              <a:extLst>
+                <a:ext uri="{28A0092B-C50C-407E-A947-70E740481C1C}">
+                  <a14:useLocalDpi xmlns:a14="http://schemas.microsoft.com/office/drawing/2010/main" val="0"/>
+                </a:ext>
+              </a:extLst>
+            </a:blip>
+            <a:stretch>
+              <a:fillRect/>
+            </a:stretch>
+          </p:blipFill>
+          <p:spPr>
+            <a:xfrm>
+              <a:off x="3225800" y="825500"/>
+              <a:ext cx="5740400" cy="5194300"/>
+            </a:xfrm>
+            <a:prstGeom prst="rect">
+              <a:avLst/>
+            </a:prstGeom>
+          </p:spPr>
+        </p:pic>
+        <p:grpSp>
+          <p:nvGrpSpPr>
+            <p:cNvPr id="5" name="Group 4"/>
+            <p:cNvGrpSpPr/>
+            <p:nvPr/>
+          </p:nvGrpSpPr>
+          <p:grpSpPr>
+            <a:xfrm>
+              <a:off x="5783998" y="3357350"/>
+              <a:ext cx="393890" cy="450376"/>
+              <a:chOff x="1331604" y="3125337"/>
+              <a:chExt cx="393890" cy="450376"/>
+            </a:xfrm>
+          </p:grpSpPr>
+          <p:sp>
+            <p:nvSpPr>
+              <p:cNvPr id="3" name="Rectangle 2"/>
+              <p:cNvSpPr/>
+              <p:nvPr/>
+            </p:nvSpPr>
+            <p:spPr>
+              <a:xfrm>
+                <a:off x="1392072" y="3125337"/>
+                <a:ext cx="272955" cy="450376"/>
+              </a:xfrm>
+              <a:prstGeom prst="rect">
+                <a:avLst/>
+              </a:prstGeom>
+            </p:spPr>
+            <p:style>
+              <a:lnRef idx="2">
+                <a:schemeClr val="accent1">
+                  <a:shade val="50000"/>
+                </a:schemeClr>
+              </a:lnRef>
+              <a:fillRef idx="1">
+                <a:schemeClr val="accent1"/>
+              </a:fillRef>
+              <a:effectRef idx="0">
+                <a:schemeClr val="accent1"/>
+              </a:effectRef>
+              <a:fontRef idx="minor">
+                <a:schemeClr val="lt1"/>
+              </a:fontRef>
+            </p:style>
+            <p:txBody>
+              <a:bodyPr rtlCol="0" anchor="ctr"/>
+              <a:lstStyle/>
+              <a:p>
+                <a:pPr algn="ctr"/>
+                <a:endParaRPr lang="en-US"/>
+              </a:p>
+            </p:txBody>
+          </p:sp>
+          <p:sp>
+            <p:nvSpPr>
+              <p:cNvPr id="4" name="TextBox 3"/>
+              <p:cNvSpPr txBox="1"/>
+              <p:nvPr/>
+            </p:nvSpPr>
+            <p:spPr>
+              <a:xfrm>
+                <a:off x="1331604" y="3212025"/>
+                <a:ext cx="393890" cy="276999"/>
+              </a:xfrm>
+              <a:prstGeom prst="rect">
+                <a:avLst/>
+              </a:prstGeom>
+              <a:noFill/>
+            </p:spPr>
+            <p:txBody>
+              <a:bodyPr wrap="none" rtlCol="0">
+                <a:spAutoFit/>
+              </a:bodyPr>
+              <a:lstStyle/>
+              <a:p>
+                <a:r>
+                  <a:rPr lang="en-US" altLang="zh-CN" sz="1200" dirty="0" smtClean="0"/>
+                  <a:t>Tag</a:t>
+                </a:r>
+                <a:endParaRPr lang="en-US" sz="1200" dirty="0"/>
+              </a:p>
+            </p:txBody>
+          </p:sp>
+        </p:grpSp>
+        <p:sp>
+          <p:nvSpPr>
+            <p:cNvPr id="7" name="Right Arrow 6"/>
+            <p:cNvSpPr/>
+            <p:nvPr/>
+          </p:nvSpPr>
+          <p:spPr>
+            <a:xfrm>
+              <a:off x="6128795" y="3220871"/>
+              <a:ext cx="2897873" cy="272956"/>
+            </a:xfrm>
+            <a:prstGeom prst="rightArrow">
+              <a:avLst/>
+            </a:prstGeom>
+          </p:spPr>
+          <p:style>
+            <a:lnRef idx="2">
+              <a:schemeClr val="dk1">
+                <a:shade val="50000"/>
+              </a:schemeClr>
+            </a:lnRef>
+            <a:fillRef idx="1">
+              <a:schemeClr val="dk1"/>
+            </a:fillRef>
+            <a:effectRef idx="0">
+              <a:schemeClr val="dk1"/>
+            </a:effectRef>
+            <a:fontRef idx="minor">
+              <a:schemeClr val="lt1"/>
+            </a:fontRef>
+          </p:style>
+          <p:txBody>
+            <a:bodyPr rtlCol="0" anchor="ctr"/>
+            <a:lstStyle/>
+            <a:p>
+              <a:pPr algn="ctr"/>
+              <a:endParaRPr lang="en-US"/>
+            </a:p>
+          </p:txBody>
+        </p:sp>
+        <p:sp>
+          <p:nvSpPr>
+            <p:cNvPr id="8" name="TextBox 7"/>
+            <p:cNvSpPr txBox="1"/>
+            <p:nvPr/>
+          </p:nvSpPr>
+          <p:spPr>
+            <a:xfrm>
+              <a:off x="9080883" y="3172683"/>
+              <a:ext cx="1421799" cy="369332"/>
+            </a:xfrm>
+            <a:prstGeom prst="rect">
+              <a:avLst/>
+            </a:prstGeom>
+            <a:noFill/>
+          </p:spPr>
+          <p:txBody>
+            <a:bodyPr wrap="none" rtlCol="0">
+              <a:spAutoFit/>
+            </a:bodyPr>
+            <a:lstStyle/>
+            <a:p>
+              <a:r>
+                <a:rPr lang="en-US" altLang="zh-CN" dirty="0" smtClean="0"/>
+                <a:t>Tag</a:t>
+              </a:r>
+              <a:r>
+                <a:rPr lang="zh-CN" altLang="en-US" dirty="0" smtClean="0"/>
+                <a:t>移动方向</a:t>
+              </a:r>
+              <a:endParaRPr lang="en-US" dirty="0"/>
+            </a:p>
+          </p:txBody>
+        </p:sp>
+      </p:grpSp>
     </p:spTree>
     <p:extLst>
       <p:ext uri="{BB962C8B-B14F-4D97-AF65-F5344CB8AC3E}">
         <p14:creationId xmlns:p14="http://schemas.microsoft.com/office/powerpoint/2010/main" val="1655167285"/>
+      </p:ext>
+    </p:extLst>
+  </p:cSld>
+  <p:clrMapOvr>
+    <a:masterClrMapping/>
+  </p:clrMapOvr>
+</p:sld>
+</file>
+
+<file path=ppt/slides/slide7.xml><?xml version="1.0" encoding="utf-8"?>
+<p:sld xmlns:a="http://schemas.openxmlformats.org/drawingml/2006/main" xmlns:r="http://schemas.openxmlformats.org/officeDocument/2006/relationships" xmlns:p="http://schemas.openxmlformats.org/presentationml/2006/main">
+  <p:cSld>
+    <p:spTree>
+      <p:nvGrpSpPr>
+        <p:cNvPr id="1" name=""/>
+        <p:cNvGrpSpPr/>
+        <p:nvPr/>
+      </p:nvGrpSpPr>
+      <p:grpSpPr>
+        <a:xfrm>
+          <a:off x="0" y="0"/>
+          <a:ext cx="0" cy="0"/>
+          <a:chOff x="0" y="0"/>
+          <a:chExt cx="0" cy="0"/>
+        </a:xfrm>
+      </p:grpSpPr>
+      <p:grpSp>
+        <p:nvGrpSpPr>
+          <p:cNvPr id="58" name="Group 57"/>
+          <p:cNvGrpSpPr/>
+          <p:nvPr/>
+        </p:nvGrpSpPr>
+        <p:grpSpPr>
+          <a:xfrm>
+            <a:off x="3753134" y="1428381"/>
+            <a:ext cx="4735769" cy="2755042"/>
+            <a:chOff x="3753134" y="1428381"/>
+            <a:chExt cx="4735769" cy="2755042"/>
+          </a:xfrm>
+        </p:grpSpPr>
+        <p:sp>
+          <p:nvSpPr>
+            <p:cNvPr id="5" name="Rectangle 4"/>
+            <p:cNvSpPr/>
+            <p:nvPr/>
+          </p:nvSpPr>
+          <p:spPr>
+            <a:xfrm>
+              <a:off x="4817660" y="1446663"/>
+              <a:ext cx="709683" cy="286603"/>
+            </a:xfrm>
+            <a:prstGeom prst="rect">
+              <a:avLst/>
+            </a:prstGeom>
+          </p:spPr>
+          <p:style>
+            <a:lnRef idx="2">
+              <a:schemeClr val="accent1">
+                <a:shade val="50000"/>
+              </a:schemeClr>
+            </a:lnRef>
+            <a:fillRef idx="1">
+              <a:schemeClr val="accent1"/>
+            </a:fillRef>
+            <a:effectRef idx="0">
+              <a:schemeClr val="accent1"/>
+            </a:effectRef>
+            <a:fontRef idx="minor">
+              <a:schemeClr val="lt1"/>
+            </a:fontRef>
+          </p:style>
+          <p:txBody>
+            <a:bodyPr rtlCol="0" anchor="ctr"/>
+            <a:lstStyle/>
+            <a:p>
+              <a:pPr algn="ctr"/>
+              <a:endParaRPr lang="en-US"/>
+            </a:p>
+          </p:txBody>
+        </p:sp>
+        <p:sp>
+          <p:nvSpPr>
+            <p:cNvPr id="6" name="TextBox 5"/>
+            <p:cNvSpPr txBox="1"/>
+            <p:nvPr/>
+          </p:nvSpPr>
+          <p:spPr>
+            <a:xfrm>
+              <a:off x="4804012" y="1428381"/>
+              <a:ext cx="728084" cy="323165"/>
+            </a:xfrm>
+            <a:prstGeom prst="rect">
+              <a:avLst/>
+            </a:prstGeom>
+            <a:noFill/>
+          </p:spPr>
+          <p:txBody>
+            <a:bodyPr wrap="none" rtlCol="0">
+              <a:spAutoFit/>
+            </a:bodyPr>
+            <a:lstStyle/>
+            <a:p>
+              <a:r>
+                <a:rPr lang="en-US" altLang="zh-CN" sz="1500" dirty="0" smtClean="0"/>
+                <a:t>Beam7</a:t>
+              </a:r>
+              <a:endParaRPr lang="en-US" sz="1500" dirty="0"/>
+            </a:p>
+          </p:txBody>
+        </p:sp>
+        <p:cxnSp>
+          <p:nvCxnSpPr>
+            <p:cNvPr id="8" name="Straight Connector 7"/>
+            <p:cNvCxnSpPr/>
+            <p:nvPr/>
+          </p:nvCxnSpPr>
+          <p:spPr>
+            <a:xfrm>
+              <a:off x="3753134" y="3616657"/>
+              <a:ext cx="4735769" cy="0"/>
+            </a:xfrm>
+            <a:prstGeom prst="line">
+              <a:avLst/>
+            </a:prstGeom>
+          </p:spPr>
+          <p:style>
+            <a:lnRef idx="1">
+              <a:schemeClr val="dk1"/>
+            </a:lnRef>
+            <a:fillRef idx="0">
+              <a:schemeClr val="dk1"/>
+            </a:fillRef>
+            <a:effectRef idx="0">
+              <a:schemeClr val="dk1"/>
+            </a:effectRef>
+            <a:fontRef idx="minor">
+              <a:schemeClr val="tx1"/>
+            </a:fontRef>
+          </p:style>
+        </p:cxnSp>
+        <p:grpSp>
+          <p:nvGrpSpPr>
+            <p:cNvPr id="11" name="Group 10"/>
+            <p:cNvGrpSpPr/>
+            <p:nvPr/>
+          </p:nvGrpSpPr>
+          <p:grpSpPr>
+            <a:xfrm>
+              <a:off x="5575377" y="3478157"/>
+              <a:ext cx="450376" cy="246221"/>
+              <a:chOff x="2217760" y="4917995"/>
+              <a:chExt cx="450376" cy="246221"/>
+            </a:xfrm>
+          </p:grpSpPr>
+          <p:sp>
+            <p:nvSpPr>
+              <p:cNvPr id="9" name="Rectangle 8"/>
+              <p:cNvSpPr/>
+              <p:nvPr/>
+            </p:nvSpPr>
+            <p:spPr>
+              <a:xfrm>
+                <a:off x="2292819" y="4967785"/>
+                <a:ext cx="218369" cy="177421"/>
+              </a:xfrm>
+              <a:prstGeom prst="rect">
+                <a:avLst/>
+              </a:prstGeom>
+              <a:solidFill>
+                <a:srgbClr val="FFC000"/>
+              </a:solidFill>
+            </p:spPr>
+            <p:style>
+              <a:lnRef idx="2">
+                <a:schemeClr val="accent1">
+                  <a:shade val="50000"/>
+                </a:schemeClr>
+              </a:lnRef>
+              <a:fillRef idx="1">
+                <a:schemeClr val="accent1"/>
+              </a:fillRef>
+              <a:effectRef idx="0">
+                <a:schemeClr val="accent1"/>
+              </a:effectRef>
+              <a:fontRef idx="minor">
+                <a:schemeClr val="lt1"/>
+              </a:fontRef>
+            </p:style>
+            <p:txBody>
+              <a:bodyPr rtlCol="0" anchor="ctr"/>
+              <a:lstStyle/>
+              <a:p>
+                <a:pPr algn="ctr"/>
+                <a:endParaRPr lang="en-US"/>
+              </a:p>
+            </p:txBody>
+          </p:sp>
+          <p:sp>
+            <p:nvSpPr>
+              <p:cNvPr id="10" name="TextBox 9"/>
+              <p:cNvSpPr txBox="1"/>
+              <p:nvPr/>
+            </p:nvSpPr>
+            <p:spPr>
+              <a:xfrm flipH="1">
+                <a:off x="2217760" y="4917995"/>
+                <a:ext cx="450376" cy="246221"/>
+              </a:xfrm>
+              <a:prstGeom prst="rect">
+                <a:avLst/>
+              </a:prstGeom>
+              <a:noFill/>
+            </p:spPr>
+            <p:txBody>
+              <a:bodyPr wrap="square" rtlCol="0">
+                <a:spAutoFit/>
+              </a:bodyPr>
+              <a:lstStyle/>
+              <a:p>
+                <a:r>
+                  <a:rPr lang="en-US" altLang="zh-CN" sz="1000" dirty="0" smtClean="0"/>
+                  <a:t>Tag</a:t>
+                </a:r>
+                <a:endParaRPr lang="en-US" sz="1000" dirty="0"/>
+              </a:p>
+            </p:txBody>
+          </p:sp>
+        </p:grpSp>
+        <p:grpSp>
+          <p:nvGrpSpPr>
+            <p:cNvPr id="12" name="Group 11"/>
+            <p:cNvGrpSpPr/>
+            <p:nvPr/>
+          </p:nvGrpSpPr>
+          <p:grpSpPr>
+            <a:xfrm>
+              <a:off x="4964506" y="3478157"/>
+              <a:ext cx="450376" cy="246221"/>
+              <a:chOff x="2217760" y="4917995"/>
+              <a:chExt cx="450376" cy="246221"/>
+            </a:xfrm>
+          </p:grpSpPr>
+          <p:sp>
+            <p:nvSpPr>
+              <p:cNvPr id="13" name="Rectangle 12"/>
+              <p:cNvSpPr/>
+              <p:nvPr/>
+            </p:nvSpPr>
+            <p:spPr>
+              <a:xfrm>
+                <a:off x="2292819" y="4967785"/>
+                <a:ext cx="218369" cy="177421"/>
+              </a:xfrm>
+              <a:prstGeom prst="rect">
+                <a:avLst/>
+              </a:prstGeom>
+              <a:solidFill>
+                <a:srgbClr val="FFC000"/>
+              </a:solidFill>
+            </p:spPr>
+            <p:style>
+              <a:lnRef idx="2">
+                <a:schemeClr val="accent1">
+                  <a:shade val="50000"/>
+                </a:schemeClr>
+              </a:lnRef>
+              <a:fillRef idx="1">
+                <a:schemeClr val="accent1"/>
+              </a:fillRef>
+              <a:effectRef idx="0">
+                <a:schemeClr val="accent1"/>
+              </a:effectRef>
+              <a:fontRef idx="minor">
+                <a:schemeClr val="lt1"/>
+              </a:fontRef>
+            </p:style>
+            <p:txBody>
+              <a:bodyPr rtlCol="0" anchor="ctr"/>
+              <a:lstStyle/>
+              <a:p>
+                <a:pPr algn="ctr"/>
+                <a:endParaRPr lang="en-US"/>
+              </a:p>
+            </p:txBody>
+          </p:sp>
+          <p:sp>
+            <p:nvSpPr>
+              <p:cNvPr id="14" name="TextBox 13"/>
+              <p:cNvSpPr txBox="1"/>
+              <p:nvPr/>
+            </p:nvSpPr>
+            <p:spPr>
+              <a:xfrm flipH="1">
+                <a:off x="2217760" y="4917995"/>
+                <a:ext cx="450376" cy="246221"/>
+              </a:xfrm>
+              <a:prstGeom prst="rect">
+                <a:avLst/>
+              </a:prstGeom>
+              <a:noFill/>
+            </p:spPr>
+            <p:txBody>
+              <a:bodyPr wrap="square" rtlCol="0">
+                <a:spAutoFit/>
+              </a:bodyPr>
+              <a:lstStyle/>
+              <a:p>
+                <a:r>
+                  <a:rPr lang="en-US" altLang="zh-CN" sz="1000" dirty="0" smtClean="0"/>
+                  <a:t>Tag</a:t>
+                </a:r>
+                <a:endParaRPr lang="en-US" sz="1000" dirty="0"/>
+              </a:p>
+            </p:txBody>
+          </p:sp>
+        </p:grpSp>
+        <p:grpSp>
+          <p:nvGrpSpPr>
+            <p:cNvPr id="15" name="Group 14"/>
+            <p:cNvGrpSpPr/>
+            <p:nvPr/>
+          </p:nvGrpSpPr>
+          <p:grpSpPr>
+            <a:xfrm>
+              <a:off x="6080607" y="3478157"/>
+              <a:ext cx="450376" cy="246221"/>
+              <a:chOff x="2217760" y="4917995"/>
+              <a:chExt cx="450376" cy="246221"/>
+            </a:xfrm>
+          </p:grpSpPr>
+          <p:sp>
+            <p:nvSpPr>
+              <p:cNvPr id="16" name="Rectangle 15"/>
+              <p:cNvSpPr/>
+              <p:nvPr/>
+            </p:nvSpPr>
+            <p:spPr>
+              <a:xfrm>
+                <a:off x="2292819" y="4967785"/>
+                <a:ext cx="218369" cy="177421"/>
+              </a:xfrm>
+              <a:prstGeom prst="rect">
+                <a:avLst/>
+              </a:prstGeom>
+              <a:solidFill>
+                <a:srgbClr val="FFC000"/>
+              </a:solidFill>
+            </p:spPr>
+            <p:style>
+              <a:lnRef idx="2">
+                <a:schemeClr val="accent1">
+                  <a:shade val="50000"/>
+                </a:schemeClr>
+              </a:lnRef>
+              <a:fillRef idx="1">
+                <a:schemeClr val="accent1"/>
+              </a:fillRef>
+              <a:effectRef idx="0">
+                <a:schemeClr val="accent1"/>
+              </a:effectRef>
+              <a:fontRef idx="minor">
+                <a:schemeClr val="lt1"/>
+              </a:fontRef>
+            </p:style>
+            <p:txBody>
+              <a:bodyPr rtlCol="0" anchor="ctr"/>
+              <a:lstStyle/>
+              <a:p>
+                <a:pPr algn="ctr"/>
+                <a:endParaRPr lang="en-US"/>
+              </a:p>
+            </p:txBody>
+          </p:sp>
+          <p:sp>
+            <p:nvSpPr>
+              <p:cNvPr id="17" name="TextBox 16"/>
+              <p:cNvSpPr txBox="1"/>
+              <p:nvPr/>
+            </p:nvSpPr>
+            <p:spPr>
+              <a:xfrm flipH="1">
+                <a:off x="2217760" y="4917995"/>
+                <a:ext cx="450376" cy="246221"/>
+              </a:xfrm>
+              <a:prstGeom prst="rect">
+                <a:avLst/>
+              </a:prstGeom>
+              <a:noFill/>
+            </p:spPr>
+            <p:txBody>
+              <a:bodyPr wrap="square" rtlCol="0">
+                <a:spAutoFit/>
+              </a:bodyPr>
+              <a:lstStyle/>
+              <a:p>
+                <a:r>
+                  <a:rPr lang="en-US" altLang="zh-CN" sz="1000" dirty="0" smtClean="0"/>
+                  <a:t>Tag</a:t>
+                </a:r>
+                <a:endParaRPr lang="en-US" sz="1000" dirty="0"/>
+              </a:p>
+            </p:txBody>
+          </p:sp>
+        </p:grpSp>
+        <p:grpSp>
+          <p:nvGrpSpPr>
+            <p:cNvPr id="18" name="Group 17"/>
+            <p:cNvGrpSpPr/>
+            <p:nvPr/>
+          </p:nvGrpSpPr>
+          <p:grpSpPr>
+            <a:xfrm>
+              <a:off x="6530983" y="3478156"/>
+              <a:ext cx="450376" cy="246221"/>
+              <a:chOff x="2217760" y="4917995"/>
+              <a:chExt cx="450376" cy="246221"/>
+            </a:xfrm>
+          </p:grpSpPr>
+          <p:sp>
+            <p:nvSpPr>
+              <p:cNvPr id="19" name="Rectangle 18"/>
+              <p:cNvSpPr/>
+              <p:nvPr/>
+            </p:nvSpPr>
+            <p:spPr>
+              <a:xfrm>
+                <a:off x="2292819" y="4967785"/>
+                <a:ext cx="218369" cy="177421"/>
+              </a:xfrm>
+              <a:prstGeom prst="rect">
+                <a:avLst/>
+              </a:prstGeom>
+              <a:solidFill>
+                <a:srgbClr val="FFC000"/>
+              </a:solidFill>
+            </p:spPr>
+            <p:style>
+              <a:lnRef idx="2">
+                <a:schemeClr val="accent1">
+                  <a:shade val="50000"/>
+                </a:schemeClr>
+              </a:lnRef>
+              <a:fillRef idx="1">
+                <a:schemeClr val="accent1"/>
+              </a:fillRef>
+              <a:effectRef idx="0">
+                <a:schemeClr val="accent1"/>
+              </a:effectRef>
+              <a:fontRef idx="minor">
+                <a:schemeClr val="lt1"/>
+              </a:fontRef>
+            </p:style>
+            <p:txBody>
+              <a:bodyPr rtlCol="0" anchor="ctr"/>
+              <a:lstStyle/>
+              <a:p>
+                <a:pPr algn="ctr"/>
+                <a:endParaRPr lang="en-US"/>
+              </a:p>
+            </p:txBody>
+          </p:sp>
+          <p:sp>
+            <p:nvSpPr>
+              <p:cNvPr id="20" name="TextBox 19"/>
+              <p:cNvSpPr txBox="1"/>
+              <p:nvPr/>
+            </p:nvSpPr>
+            <p:spPr>
+              <a:xfrm flipH="1">
+                <a:off x="2217760" y="4917995"/>
+                <a:ext cx="450376" cy="246221"/>
+              </a:xfrm>
+              <a:prstGeom prst="rect">
+                <a:avLst/>
+              </a:prstGeom>
+              <a:noFill/>
+            </p:spPr>
+            <p:txBody>
+              <a:bodyPr wrap="square" rtlCol="0">
+                <a:spAutoFit/>
+              </a:bodyPr>
+              <a:lstStyle/>
+              <a:p>
+                <a:r>
+                  <a:rPr lang="en-US" altLang="zh-CN" sz="1000" dirty="0" smtClean="0"/>
+                  <a:t>Tag</a:t>
+                </a:r>
+                <a:endParaRPr lang="en-US" sz="1000" dirty="0"/>
+              </a:p>
+            </p:txBody>
+          </p:sp>
+        </p:grpSp>
+        <p:grpSp>
+          <p:nvGrpSpPr>
+            <p:cNvPr id="21" name="Group 20"/>
+            <p:cNvGrpSpPr/>
+            <p:nvPr/>
+          </p:nvGrpSpPr>
+          <p:grpSpPr>
+            <a:xfrm>
+              <a:off x="6913119" y="3473354"/>
+              <a:ext cx="450376" cy="246221"/>
+              <a:chOff x="2217760" y="4917995"/>
+              <a:chExt cx="450376" cy="246221"/>
+            </a:xfrm>
+          </p:grpSpPr>
+          <p:sp>
+            <p:nvSpPr>
+              <p:cNvPr id="22" name="Rectangle 21"/>
+              <p:cNvSpPr/>
+              <p:nvPr/>
+            </p:nvSpPr>
+            <p:spPr>
+              <a:xfrm>
+                <a:off x="2292819" y="4967785"/>
+                <a:ext cx="218369" cy="177421"/>
+              </a:xfrm>
+              <a:prstGeom prst="rect">
+                <a:avLst/>
+              </a:prstGeom>
+              <a:solidFill>
+                <a:srgbClr val="FFC000"/>
+              </a:solidFill>
+            </p:spPr>
+            <p:style>
+              <a:lnRef idx="2">
+                <a:schemeClr val="accent1">
+                  <a:shade val="50000"/>
+                </a:schemeClr>
+              </a:lnRef>
+              <a:fillRef idx="1">
+                <a:schemeClr val="accent1"/>
+              </a:fillRef>
+              <a:effectRef idx="0">
+                <a:schemeClr val="accent1"/>
+              </a:effectRef>
+              <a:fontRef idx="minor">
+                <a:schemeClr val="lt1"/>
+              </a:fontRef>
+            </p:style>
+            <p:txBody>
+              <a:bodyPr rtlCol="0" anchor="ctr"/>
+              <a:lstStyle/>
+              <a:p>
+                <a:pPr algn="ctr"/>
+                <a:endParaRPr lang="en-US"/>
+              </a:p>
+            </p:txBody>
+          </p:sp>
+          <p:sp>
+            <p:nvSpPr>
+              <p:cNvPr id="23" name="TextBox 22"/>
+              <p:cNvSpPr txBox="1"/>
+              <p:nvPr/>
+            </p:nvSpPr>
+            <p:spPr>
+              <a:xfrm flipH="1">
+                <a:off x="2217760" y="4917995"/>
+                <a:ext cx="450376" cy="246221"/>
+              </a:xfrm>
+              <a:prstGeom prst="rect">
+                <a:avLst/>
+              </a:prstGeom>
+              <a:noFill/>
+            </p:spPr>
+            <p:txBody>
+              <a:bodyPr wrap="square" rtlCol="0">
+                <a:spAutoFit/>
+              </a:bodyPr>
+              <a:lstStyle/>
+              <a:p>
+                <a:r>
+                  <a:rPr lang="en-US" altLang="zh-CN" sz="1000" dirty="0" smtClean="0"/>
+                  <a:t>Tag</a:t>
+                </a:r>
+                <a:endParaRPr lang="en-US" sz="1000" dirty="0"/>
+              </a:p>
+            </p:txBody>
+          </p:sp>
+        </p:grpSp>
+        <p:grpSp>
+          <p:nvGrpSpPr>
+            <p:cNvPr id="24" name="Group 23"/>
+            <p:cNvGrpSpPr/>
+            <p:nvPr/>
+          </p:nvGrpSpPr>
+          <p:grpSpPr>
+            <a:xfrm>
+              <a:off x="7261401" y="3468552"/>
+              <a:ext cx="450376" cy="246221"/>
+              <a:chOff x="2217760" y="4917995"/>
+              <a:chExt cx="450376" cy="246221"/>
+            </a:xfrm>
+          </p:grpSpPr>
+          <p:sp>
+            <p:nvSpPr>
+              <p:cNvPr id="25" name="Rectangle 24"/>
+              <p:cNvSpPr/>
+              <p:nvPr/>
+            </p:nvSpPr>
+            <p:spPr>
+              <a:xfrm>
+                <a:off x="2292819" y="4967785"/>
+                <a:ext cx="218369" cy="177421"/>
+              </a:xfrm>
+              <a:prstGeom prst="rect">
+                <a:avLst/>
+              </a:prstGeom>
+              <a:solidFill>
+                <a:srgbClr val="FFC000"/>
+              </a:solidFill>
+            </p:spPr>
+            <p:style>
+              <a:lnRef idx="2">
+                <a:schemeClr val="accent1">
+                  <a:shade val="50000"/>
+                </a:schemeClr>
+              </a:lnRef>
+              <a:fillRef idx="1">
+                <a:schemeClr val="accent1"/>
+              </a:fillRef>
+              <a:effectRef idx="0">
+                <a:schemeClr val="accent1"/>
+              </a:effectRef>
+              <a:fontRef idx="minor">
+                <a:schemeClr val="lt1"/>
+              </a:fontRef>
+            </p:style>
+            <p:txBody>
+              <a:bodyPr rtlCol="0" anchor="ctr"/>
+              <a:lstStyle/>
+              <a:p>
+                <a:pPr algn="ctr"/>
+                <a:endParaRPr lang="en-US"/>
+              </a:p>
+            </p:txBody>
+          </p:sp>
+          <p:sp>
+            <p:nvSpPr>
+              <p:cNvPr id="26" name="TextBox 25"/>
+              <p:cNvSpPr txBox="1"/>
+              <p:nvPr/>
+            </p:nvSpPr>
+            <p:spPr>
+              <a:xfrm flipH="1">
+                <a:off x="2217760" y="4917995"/>
+                <a:ext cx="450376" cy="246221"/>
+              </a:xfrm>
+              <a:prstGeom prst="rect">
+                <a:avLst/>
+              </a:prstGeom>
+              <a:noFill/>
+            </p:spPr>
+            <p:txBody>
+              <a:bodyPr wrap="square" rtlCol="0">
+                <a:spAutoFit/>
+              </a:bodyPr>
+              <a:lstStyle/>
+              <a:p>
+                <a:r>
+                  <a:rPr lang="en-US" altLang="zh-CN" sz="1000" dirty="0" smtClean="0"/>
+                  <a:t>Tag</a:t>
+                </a:r>
+                <a:endParaRPr lang="en-US" sz="1000" dirty="0"/>
+              </a:p>
+            </p:txBody>
+          </p:sp>
+        </p:grpSp>
+        <p:cxnSp>
+          <p:nvCxnSpPr>
+            <p:cNvPr id="30" name="Straight Connector 29"/>
+            <p:cNvCxnSpPr>
+              <a:stCxn id="5" idx="2"/>
+            </p:cNvCxnSpPr>
+            <p:nvPr/>
+          </p:nvCxnSpPr>
+          <p:spPr>
+            <a:xfrm flipH="1">
+              <a:off x="5148749" y="1733266"/>
+              <a:ext cx="23753" cy="1873785"/>
+            </a:xfrm>
+            <a:prstGeom prst="line">
+              <a:avLst/>
+            </a:prstGeom>
+          </p:spPr>
+          <p:style>
+            <a:lnRef idx="1">
+              <a:schemeClr val="accent3"/>
+            </a:lnRef>
+            <a:fillRef idx="0">
+              <a:schemeClr val="accent3"/>
+            </a:fillRef>
+            <a:effectRef idx="0">
+              <a:schemeClr val="accent3"/>
+            </a:effectRef>
+            <a:fontRef idx="minor">
+              <a:schemeClr val="tx1"/>
+            </a:fontRef>
+          </p:style>
+        </p:cxnSp>
+        <p:cxnSp>
+          <p:nvCxnSpPr>
+            <p:cNvPr id="31" name="Straight Connector 30"/>
+            <p:cNvCxnSpPr>
+              <a:stCxn id="5" idx="2"/>
+            </p:cNvCxnSpPr>
+            <p:nvPr/>
+          </p:nvCxnSpPr>
+          <p:spPr>
+            <a:xfrm>
+              <a:off x="5172502" y="1733266"/>
+              <a:ext cx="587118" cy="1865111"/>
+            </a:xfrm>
+            <a:prstGeom prst="line">
+              <a:avLst/>
+            </a:prstGeom>
+          </p:spPr>
+          <p:style>
+            <a:lnRef idx="1">
+              <a:schemeClr val="accent3"/>
+            </a:lnRef>
+            <a:fillRef idx="0">
+              <a:schemeClr val="accent3"/>
+            </a:fillRef>
+            <a:effectRef idx="0">
+              <a:schemeClr val="accent3"/>
+            </a:effectRef>
+            <a:fontRef idx="minor">
+              <a:schemeClr val="tx1"/>
+            </a:fontRef>
+          </p:style>
+        </p:cxnSp>
+        <p:cxnSp>
+          <p:nvCxnSpPr>
+            <p:cNvPr id="34" name="Straight Connector 33"/>
+            <p:cNvCxnSpPr>
+              <a:stCxn id="6" idx="2"/>
+            </p:cNvCxnSpPr>
+            <p:nvPr/>
+          </p:nvCxnSpPr>
+          <p:spPr>
+            <a:xfrm>
+              <a:off x="5168054" y="1751546"/>
+              <a:ext cx="2277590" cy="1846831"/>
+            </a:xfrm>
+            <a:prstGeom prst="line">
+              <a:avLst/>
+            </a:prstGeom>
+          </p:spPr>
+          <p:style>
+            <a:lnRef idx="1">
+              <a:schemeClr val="accent3"/>
+            </a:lnRef>
+            <a:fillRef idx="0">
+              <a:schemeClr val="accent3"/>
+            </a:fillRef>
+            <a:effectRef idx="0">
+              <a:schemeClr val="accent3"/>
+            </a:effectRef>
+            <a:fontRef idx="minor">
+              <a:schemeClr val="tx1"/>
+            </a:fontRef>
+          </p:style>
+        </p:cxnSp>
+        <p:cxnSp>
+          <p:nvCxnSpPr>
+            <p:cNvPr id="35" name="Straight Connector 34"/>
+            <p:cNvCxnSpPr>
+              <a:stCxn id="5" idx="2"/>
+            </p:cNvCxnSpPr>
+            <p:nvPr/>
+          </p:nvCxnSpPr>
+          <p:spPr>
+            <a:xfrm>
+              <a:off x="5172502" y="1733266"/>
+              <a:ext cx="1078439" cy="1883389"/>
+            </a:xfrm>
+            <a:prstGeom prst="line">
+              <a:avLst/>
+            </a:prstGeom>
+          </p:spPr>
+          <p:style>
+            <a:lnRef idx="1">
+              <a:schemeClr val="accent3"/>
+            </a:lnRef>
+            <a:fillRef idx="0">
+              <a:schemeClr val="accent3"/>
+            </a:fillRef>
+            <a:effectRef idx="0">
+              <a:schemeClr val="accent3"/>
+            </a:effectRef>
+            <a:fontRef idx="minor">
+              <a:schemeClr val="tx1"/>
+            </a:fontRef>
+          </p:style>
+        </p:cxnSp>
+        <p:cxnSp>
+          <p:nvCxnSpPr>
+            <p:cNvPr id="36" name="Straight Connector 35"/>
+            <p:cNvCxnSpPr>
+              <a:stCxn id="5" idx="2"/>
+            </p:cNvCxnSpPr>
+            <p:nvPr/>
+          </p:nvCxnSpPr>
+          <p:spPr>
+            <a:xfrm>
+              <a:off x="5172502" y="1733266"/>
+              <a:ext cx="1521975" cy="1873785"/>
+            </a:xfrm>
+            <a:prstGeom prst="line">
+              <a:avLst/>
+            </a:prstGeom>
+          </p:spPr>
+          <p:style>
+            <a:lnRef idx="1">
+              <a:schemeClr val="accent3"/>
+            </a:lnRef>
+            <a:fillRef idx="0">
+              <a:schemeClr val="accent3"/>
+            </a:fillRef>
+            <a:effectRef idx="0">
+              <a:schemeClr val="accent3"/>
+            </a:effectRef>
+            <a:fontRef idx="minor">
+              <a:schemeClr val="tx1"/>
+            </a:fontRef>
+          </p:style>
+        </p:cxnSp>
+        <p:cxnSp>
+          <p:nvCxnSpPr>
+            <p:cNvPr id="37" name="Straight Connector 36"/>
+            <p:cNvCxnSpPr>
+              <a:stCxn id="5" idx="2"/>
+            </p:cNvCxnSpPr>
+            <p:nvPr/>
+          </p:nvCxnSpPr>
+          <p:spPr>
+            <a:xfrm>
+              <a:off x="5172502" y="1733266"/>
+              <a:ext cx="1924860" cy="1865111"/>
+            </a:xfrm>
+            <a:prstGeom prst="line">
+              <a:avLst/>
+            </a:prstGeom>
+          </p:spPr>
+          <p:style>
+            <a:lnRef idx="1">
+              <a:schemeClr val="accent3"/>
+            </a:lnRef>
+            <a:fillRef idx="0">
+              <a:schemeClr val="accent3"/>
+            </a:fillRef>
+            <a:effectRef idx="0">
+              <a:schemeClr val="accent3"/>
+            </a:effectRef>
+            <a:fontRef idx="minor">
+              <a:schemeClr val="tx1"/>
+            </a:fontRef>
+          </p:style>
+        </p:cxnSp>
+        <p:sp>
+          <p:nvSpPr>
+            <p:cNvPr id="48" name="TextBox 47"/>
+            <p:cNvSpPr txBox="1"/>
+            <p:nvPr/>
+          </p:nvSpPr>
+          <p:spPr>
+            <a:xfrm>
+              <a:off x="5008463" y="2531953"/>
+              <a:ext cx="343364" cy="276999"/>
+            </a:xfrm>
+            <a:prstGeom prst="rect">
+              <a:avLst/>
+            </a:prstGeom>
+            <a:noFill/>
+          </p:spPr>
+          <p:txBody>
+            <a:bodyPr wrap="none" rtlCol="0">
+              <a:spAutoFit/>
+            </a:bodyPr>
+            <a:lstStyle/>
+            <a:p>
+              <a:r>
+                <a:rPr lang="en-US" altLang="zh-CN" sz="1200" dirty="0" smtClean="0"/>
+                <a:t>d1</a:t>
+              </a:r>
+              <a:endParaRPr lang="en-US" sz="1200" dirty="0"/>
+            </a:p>
+          </p:txBody>
+        </p:sp>
+        <p:sp>
+          <p:nvSpPr>
+            <p:cNvPr id="49" name="TextBox 48"/>
+            <p:cNvSpPr txBox="1"/>
+            <p:nvPr/>
+          </p:nvSpPr>
+          <p:spPr>
+            <a:xfrm>
+              <a:off x="5368357" y="2804130"/>
+              <a:ext cx="343364" cy="276999"/>
+            </a:xfrm>
+            <a:prstGeom prst="rect">
+              <a:avLst/>
+            </a:prstGeom>
+            <a:noFill/>
+          </p:spPr>
+          <p:txBody>
+            <a:bodyPr wrap="none" rtlCol="0">
+              <a:spAutoFit/>
+            </a:bodyPr>
+            <a:lstStyle/>
+            <a:p>
+              <a:r>
+                <a:rPr lang="en-US" altLang="zh-CN" sz="1200" dirty="0" smtClean="0"/>
+                <a:t>d2</a:t>
+              </a:r>
+              <a:endParaRPr lang="en-US" sz="1200" dirty="0"/>
+            </a:p>
+          </p:txBody>
+        </p:sp>
+        <p:sp>
+          <p:nvSpPr>
+            <p:cNvPr id="50" name="TextBox 49"/>
+            <p:cNvSpPr txBox="1"/>
+            <p:nvPr/>
+          </p:nvSpPr>
+          <p:spPr>
+            <a:xfrm>
+              <a:off x="6399536" y="2960005"/>
+              <a:ext cx="343364" cy="276999"/>
+            </a:xfrm>
+            <a:prstGeom prst="rect">
+              <a:avLst/>
+            </a:prstGeom>
+            <a:noFill/>
+          </p:spPr>
+          <p:txBody>
+            <a:bodyPr wrap="none" rtlCol="0">
+              <a:spAutoFit/>
+            </a:bodyPr>
+            <a:lstStyle/>
+            <a:p>
+              <a:r>
+                <a:rPr lang="en-US" altLang="zh-CN" sz="1200" dirty="0"/>
+                <a:t>d</a:t>
+              </a:r>
+              <a:r>
+                <a:rPr lang="en-US" altLang="zh-CN" sz="1200" dirty="0" smtClean="0"/>
+                <a:t>5</a:t>
+              </a:r>
+              <a:endParaRPr lang="zh-CN" altLang="en-US" sz="1200" dirty="0" smtClean="0"/>
+            </a:p>
+          </p:txBody>
+        </p:sp>
+        <p:sp>
+          <p:nvSpPr>
+            <p:cNvPr id="53" name="TextBox 52"/>
+            <p:cNvSpPr txBox="1"/>
+            <p:nvPr/>
+          </p:nvSpPr>
+          <p:spPr>
+            <a:xfrm>
+              <a:off x="6244398" y="2556563"/>
+              <a:ext cx="343364" cy="276999"/>
+            </a:xfrm>
+            <a:prstGeom prst="rect">
+              <a:avLst/>
+            </a:prstGeom>
+            <a:noFill/>
+          </p:spPr>
+          <p:txBody>
+            <a:bodyPr wrap="none" rtlCol="0">
+              <a:spAutoFit/>
+            </a:bodyPr>
+            <a:lstStyle/>
+            <a:p>
+              <a:r>
+                <a:rPr lang="en-US" altLang="zh-CN" sz="1200" dirty="0" smtClean="0"/>
+                <a:t>d6</a:t>
+              </a:r>
+              <a:endParaRPr lang="en-US" sz="1200" dirty="0"/>
+            </a:p>
+          </p:txBody>
+        </p:sp>
+        <p:sp>
+          <p:nvSpPr>
+            <p:cNvPr id="54" name="TextBox 53"/>
+            <p:cNvSpPr txBox="1"/>
+            <p:nvPr/>
+          </p:nvSpPr>
+          <p:spPr>
+            <a:xfrm>
+              <a:off x="5968466" y="2843168"/>
+              <a:ext cx="343364" cy="276999"/>
+            </a:xfrm>
+            <a:prstGeom prst="rect">
+              <a:avLst/>
+            </a:prstGeom>
+            <a:noFill/>
+          </p:spPr>
+          <p:txBody>
+            <a:bodyPr wrap="none" rtlCol="0">
+              <a:spAutoFit/>
+            </a:bodyPr>
+            <a:lstStyle/>
+            <a:p>
+              <a:r>
+                <a:rPr lang="en-US" altLang="zh-CN" sz="1200" smtClean="0"/>
+                <a:t>d4</a:t>
+              </a:r>
+              <a:endParaRPr lang="en-US" sz="1200" dirty="0"/>
+            </a:p>
+          </p:txBody>
+        </p:sp>
+        <p:sp>
+          <p:nvSpPr>
+            <p:cNvPr id="55" name="TextBox 54"/>
+            <p:cNvSpPr txBox="1"/>
+            <p:nvPr/>
+          </p:nvSpPr>
+          <p:spPr>
+            <a:xfrm>
+              <a:off x="5563792" y="2545602"/>
+              <a:ext cx="343364" cy="276999"/>
+            </a:xfrm>
+            <a:prstGeom prst="rect">
+              <a:avLst/>
+            </a:prstGeom>
+            <a:noFill/>
+          </p:spPr>
+          <p:txBody>
+            <a:bodyPr wrap="none" rtlCol="0">
+              <a:spAutoFit/>
+            </a:bodyPr>
+            <a:lstStyle/>
+            <a:p>
+              <a:r>
+                <a:rPr lang="en-US" altLang="zh-CN" sz="1200" dirty="0" smtClean="0"/>
+                <a:t>d3</a:t>
+              </a:r>
+              <a:endParaRPr lang="en-US" sz="1200" dirty="0"/>
+            </a:p>
+          </p:txBody>
+        </p:sp>
+        <p:sp>
+          <p:nvSpPr>
+            <p:cNvPr id="57" name="TextBox 56"/>
+            <p:cNvSpPr txBox="1"/>
+            <p:nvPr/>
+          </p:nvSpPr>
+          <p:spPr>
+            <a:xfrm>
+              <a:off x="3872230" y="3875646"/>
+              <a:ext cx="3573414" cy="307777"/>
+            </a:xfrm>
+            <a:prstGeom prst="rect">
+              <a:avLst/>
+            </a:prstGeom>
+            <a:noFill/>
+          </p:spPr>
+          <p:txBody>
+            <a:bodyPr wrap="none" rtlCol="0">
+              <a:spAutoFit/>
+            </a:bodyPr>
+            <a:lstStyle/>
+            <a:p>
+              <a:r>
+                <a:rPr lang="en-US" altLang="zh-CN" sz="1400" dirty="0" smtClean="0"/>
+                <a:t>d6</a:t>
+              </a:r>
+              <a:r>
+                <a:rPr lang="zh-CN" altLang="en-US" sz="1400" dirty="0" smtClean="0"/>
+                <a:t> </a:t>
+              </a:r>
+              <a:r>
+                <a:rPr lang="mr-IN" altLang="zh-CN" sz="1400" dirty="0" smtClean="0"/>
+                <a:t>–</a:t>
+              </a:r>
+              <a:r>
+                <a:rPr lang="zh-CN" altLang="en-US" sz="1400" dirty="0" smtClean="0"/>
+                <a:t> </a:t>
+              </a:r>
+              <a:r>
+                <a:rPr lang="en-US" altLang="zh-CN" sz="1400" dirty="0" smtClean="0"/>
+                <a:t>d5</a:t>
+              </a:r>
+              <a:r>
+                <a:rPr lang="zh-CN" altLang="en-US" sz="1400" dirty="0" smtClean="0"/>
+                <a:t> </a:t>
+              </a:r>
+              <a:r>
+                <a:rPr lang="en-US" altLang="zh-CN" sz="1400" dirty="0" smtClean="0"/>
+                <a:t>=</a:t>
+              </a:r>
+              <a:r>
+                <a:rPr lang="zh-CN" altLang="en-US" sz="1400" dirty="0" smtClean="0"/>
+                <a:t> </a:t>
+              </a:r>
+              <a:r>
+                <a:rPr lang="en-US" altLang="zh-CN" sz="1400" dirty="0" smtClean="0"/>
+                <a:t>d5</a:t>
+              </a:r>
+              <a:r>
+                <a:rPr lang="zh-CN" altLang="en-US" sz="1400" dirty="0" smtClean="0"/>
+                <a:t> </a:t>
+              </a:r>
+              <a:r>
+                <a:rPr lang="mr-IN" altLang="zh-CN" sz="1400" dirty="0" smtClean="0"/>
+                <a:t>–</a:t>
+              </a:r>
+              <a:r>
+                <a:rPr lang="zh-CN" altLang="en-US" sz="1400" dirty="0" smtClean="0"/>
+                <a:t> </a:t>
+              </a:r>
+              <a:r>
+                <a:rPr lang="en-US" altLang="zh-CN" sz="1400" dirty="0" smtClean="0"/>
+                <a:t>d4</a:t>
+              </a:r>
+              <a:r>
+                <a:rPr lang="zh-CN" altLang="en-US" sz="1400" dirty="0" smtClean="0"/>
+                <a:t> </a:t>
+              </a:r>
+              <a:r>
+                <a:rPr lang="en-US" altLang="zh-CN" sz="1400" dirty="0" smtClean="0"/>
+                <a:t>=</a:t>
+              </a:r>
+              <a:r>
+                <a:rPr lang="zh-CN" altLang="en-US" sz="1400" dirty="0" smtClean="0"/>
+                <a:t> </a:t>
+              </a:r>
+              <a:r>
+                <a:rPr lang="en-US" altLang="zh-CN" sz="1400" dirty="0" smtClean="0"/>
+                <a:t>d4</a:t>
+              </a:r>
+              <a:r>
+                <a:rPr lang="zh-CN" altLang="en-US" sz="1400" dirty="0" smtClean="0"/>
+                <a:t> </a:t>
+              </a:r>
+              <a:r>
+                <a:rPr lang="mr-IN" altLang="zh-CN" sz="1400" dirty="0" smtClean="0"/>
+                <a:t>–</a:t>
+              </a:r>
+              <a:r>
+                <a:rPr lang="zh-CN" altLang="en-US" sz="1400" dirty="0" smtClean="0"/>
+                <a:t> </a:t>
+              </a:r>
+              <a:r>
+                <a:rPr lang="en-US" altLang="zh-CN" sz="1400" dirty="0" smtClean="0"/>
+                <a:t>d3</a:t>
+              </a:r>
+              <a:r>
+                <a:rPr lang="zh-CN" altLang="en-US" sz="1400" dirty="0" smtClean="0"/>
+                <a:t> </a:t>
+              </a:r>
+              <a:r>
+                <a:rPr lang="en-US" altLang="zh-CN" sz="1400" dirty="0" smtClean="0"/>
+                <a:t>=</a:t>
+              </a:r>
+              <a:r>
+                <a:rPr lang="zh-CN" altLang="en-US" sz="1400" dirty="0" smtClean="0"/>
+                <a:t> </a:t>
+              </a:r>
+              <a:r>
+                <a:rPr lang="en-US" altLang="zh-CN" sz="1400" dirty="0" smtClean="0"/>
+                <a:t>d3</a:t>
+              </a:r>
+              <a:r>
+                <a:rPr lang="zh-CN" altLang="en-US" sz="1400" dirty="0" smtClean="0"/>
+                <a:t> </a:t>
+              </a:r>
+              <a:r>
+                <a:rPr lang="mr-IN" altLang="zh-CN" sz="1400" dirty="0" smtClean="0"/>
+                <a:t>–</a:t>
+              </a:r>
+              <a:r>
+                <a:rPr lang="zh-CN" altLang="en-US" sz="1400" dirty="0" smtClean="0"/>
+                <a:t> </a:t>
+              </a:r>
+              <a:r>
+                <a:rPr lang="en-US" altLang="zh-CN" sz="1400" dirty="0" smtClean="0"/>
+                <a:t>d2</a:t>
+              </a:r>
+              <a:r>
+                <a:rPr lang="zh-CN" altLang="en-US" sz="1400" dirty="0" smtClean="0"/>
+                <a:t> </a:t>
+              </a:r>
+              <a:r>
+                <a:rPr lang="en-US" altLang="zh-CN" sz="1400" dirty="0" smtClean="0"/>
+                <a:t>=</a:t>
+              </a:r>
+              <a:r>
+                <a:rPr lang="zh-CN" altLang="en-US" sz="1400" dirty="0" smtClean="0"/>
+                <a:t> </a:t>
+              </a:r>
+              <a:r>
+                <a:rPr lang="en-US" altLang="zh-CN" sz="1400" dirty="0" smtClean="0"/>
+                <a:t>d2</a:t>
+              </a:r>
+              <a:r>
+                <a:rPr lang="zh-CN" altLang="en-US" sz="1400" dirty="0" smtClean="0"/>
+                <a:t> </a:t>
+              </a:r>
+              <a:r>
+                <a:rPr lang="mr-IN" altLang="zh-CN" sz="1400" dirty="0" smtClean="0"/>
+                <a:t>–</a:t>
+              </a:r>
+              <a:r>
+                <a:rPr lang="zh-CN" altLang="en-US" sz="1400" dirty="0" smtClean="0"/>
+                <a:t> </a:t>
+              </a:r>
+              <a:r>
+                <a:rPr lang="en-US" altLang="zh-CN" sz="1400" dirty="0" smtClean="0"/>
+                <a:t>d1</a:t>
+              </a:r>
+              <a:endParaRPr lang="en-US" sz="1400" dirty="0"/>
+            </a:p>
+          </p:txBody>
+        </p:sp>
+      </p:grpSp>
+    </p:spTree>
+    <p:extLst>
+      <p:ext uri="{BB962C8B-B14F-4D97-AF65-F5344CB8AC3E}">
+        <p14:creationId xmlns:p14="http://schemas.microsoft.com/office/powerpoint/2010/main" val="1514703447"/>
+      </p:ext>
+    </p:extLst>
+  </p:cSld>
+  <p:clrMapOvr>
+    <a:masterClrMapping/>
+  </p:clrMapOvr>
+</p:sld>
+</file>
+
+<file path=ppt/slides/slide8.xml><?xml version="1.0" encoding="utf-8"?>
+<p:sld xmlns:a="http://schemas.openxmlformats.org/drawingml/2006/main" xmlns:r="http://schemas.openxmlformats.org/officeDocument/2006/relationships" xmlns:p="http://schemas.openxmlformats.org/presentationml/2006/main">
+  <p:cSld>
+    <p:spTree>
+      <p:nvGrpSpPr>
+        <p:cNvPr id="1" name=""/>
+        <p:cNvGrpSpPr/>
+        <p:nvPr/>
+      </p:nvGrpSpPr>
+      <p:grpSpPr>
+        <a:xfrm>
+          <a:off x="0" y="0"/>
+          <a:ext cx="0" cy="0"/>
+          <a:chOff x="0" y="0"/>
+          <a:chExt cx="0" cy="0"/>
+        </a:xfrm>
+      </p:grpSpPr>
+      <p:pic>
+        <p:nvPicPr>
+          <p:cNvPr id="4" name="Picture 3"/>
+          <p:cNvPicPr>
+            <a:picLocks noChangeAspect="1"/>
+          </p:cNvPicPr>
+          <p:nvPr/>
+        </p:nvPicPr>
+        <p:blipFill>
+          <a:blip r:embed="rId2"/>
+          <a:stretch>
+            <a:fillRect/>
+          </a:stretch>
+        </p:blipFill>
+        <p:spPr>
+          <a:xfrm>
+            <a:off x="-1" y="1614053"/>
+            <a:ext cx="5883565" cy="4412674"/>
+          </a:xfrm>
+          <a:prstGeom prst="rect">
+            <a:avLst/>
+          </a:prstGeom>
+        </p:spPr>
+      </p:pic>
+    </p:spTree>
+    <p:extLst>
+      <p:ext uri="{BB962C8B-B14F-4D97-AF65-F5344CB8AC3E}">
+        <p14:creationId xmlns:p14="http://schemas.microsoft.com/office/powerpoint/2010/main" val="1857794019"/>
+      </p:ext>
+    </p:extLst>
+  </p:cSld>
+  <p:clrMapOvr>
+    <a:masterClrMapping/>
+  </p:clrMapOvr>
+</p:sld>
+</file>
+
+<file path=ppt/slides/slide9.xml><?xml version="1.0" encoding="utf-8"?>
+<p:sld xmlns:a="http://schemas.openxmlformats.org/drawingml/2006/main" xmlns:r="http://schemas.openxmlformats.org/officeDocument/2006/relationships" xmlns:p="http://schemas.openxmlformats.org/presentationml/2006/main">
+  <p:cSld>
+    <p:spTree>
+      <p:nvGrpSpPr>
+        <p:cNvPr id="1" name=""/>
+        <p:cNvGrpSpPr/>
+        <p:nvPr/>
+      </p:nvGrpSpPr>
+      <p:grpSpPr>
+        <a:xfrm>
+          <a:off x="0" y="0"/>
+          <a:ext cx="0" cy="0"/>
+          <a:chOff x="0" y="0"/>
+          <a:chExt cx="0" cy="0"/>
+        </a:xfrm>
+      </p:grpSpPr>
+      <p:grpSp>
+        <p:nvGrpSpPr>
+          <p:cNvPr id="8" name="Group 7"/>
+          <p:cNvGrpSpPr/>
+          <p:nvPr/>
+        </p:nvGrpSpPr>
+        <p:grpSpPr>
+          <a:xfrm>
+            <a:off x="2540000" y="762000"/>
+            <a:ext cx="7112000" cy="5334000"/>
+            <a:chOff x="2540000" y="762000"/>
+            <a:chExt cx="7112000" cy="5334000"/>
+          </a:xfrm>
+        </p:grpSpPr>
+        <p:pic>
+          <p:nvPicPr>
+            <p:cNvPr id="7" name="Picture 6"/>
+            <p:cNvPicPr>
+              <a:picLocks noChangeAspect="1"/>
+            </p:cNvPicPr>
+            <p:nvPr/>
+          </p:nvPicPr>
+          <p:blipFill>
+            <a:blip r:embed="rId2"/>
+            <a:stretch>
+              <a:fillRect/>
+            </a:stretch>
+          </p:blipFill>
+          <p:spPr>
+            <a:xfrm>
+              <a:off x="2540000" y="762000"/>
+              <a:ext cx="7112000" cy="5334000"/>
+            </a:xfrm>
+            <a:prstGeom prst="rect">
+              <a:avLst/>
+            </a:prstGeom>
+          </p:spPr>
+        </p:pic>
+        <p:sp>
+          <p:nvSpPr>
+            <p:cNvPr id="5" name="TextBox 4"/>
+            <p:cNvSpPr txBox="1"/>
+            <p:nvPr/>
+          </p:nvSpPr>
+          <p:spPr>
+            <a:xfrm>
+              <a:off x="4476466" y="1214650"/>
+              <a:ext cx="744114" cy="307777"/>
+            </a:xfrm>
+            <a:prstGeom prst="rect">
+              <a:avLst/>
+            </a:prstGeom>
+            <a:noFill/>
+          </p:spPr>
+          <p:txBody>
+            <a:bodyPr wrap="none" rtlCol="0">
+              <a:spAutoFit/>
+            </a:bodyPr>
+            <a:lstStyle/>
+            <a:p>
+              <a:r>
+                <a:rPr lang="en-US" sz="1400" dirty="0" smtClean="0"/>
+                <a:t>(0, 130)</a:t>
+              </a:r>
+              <a:endParaRPr lang="en-US" sz="1400" dirty="0"/>
+            </a:p>
+          </p:txBody>
+        </p:sp>
+      </p:grpSp>
+    </p:spTree>
+    <p:extLst>
+      <p:ext uri="{BB962C8B-B14F-4D97-AF65-F5344CB8AC3E}">
+        <p14:creationId xmlns:p14="http://schemas.microsoft.com/office/powerpoint/2010/main" val="238800682"/>
       </p:ext>
     </p:extLst>
   </p:cSld>

</xml_diff>